<commit_message>
added new files for Sem_202
</commit_message>
<xml_diff>
--- a/Semester_202/SP1033/Bài giảng môn Kinh tế Chính trị Mác - Lênin-20210303/Chương 1.pptx
+++ b/Semester_202/SP1033/Bài giảng môn Kinh tế Chính trị Mác - Lênin-20210303/Chương 1.pptx
@@ -184,7 +184,7 @@
           <a:p>
             <a:fld id="{1CC9C04C-9B95-414E-9378-D3E069C6AD57}" type="datetimeFigureOut">
               <a:rPr lang="en-US" smtClean="0"/>
-              <a:t>18/02/2021</a:t>
+              <a:t>3/8/2021</a:t>
             </a:fld>
             <a:endParaRPr lang="en-US"/>
           </a:p>
@@ -425,7 +425,7 @@
           <a:p>
             <a:fld id="{1CC9C04C-9B95-414E-9378-D3E069C6AD57}" type="datetimeFigureOut">
               <a:rPr lang="en-US" smtClean="0"/>
-              <a:t>18/02/2021</a:t>
+              <a:t>3/8/2021</a:t>
             </a:fld>
             <a:endParaRPr lang="en-US"/>
           </a:p>
@@ -1203,6 +1203,132 @@
           </a:prstGeom>
         </p:spPr>
       </p:pic>
+      <p:sp>
+        <p:nvSpPr>
+          <p:cNvPr id="4" name="TextBox 3">
+            <a:extLst>
+              <a:ext uri="{FF2B5EF4-FFF2-40B4-BE49-F238E27FC236}">
+                <a16:creationId xmlns:a16="http://schemas.microsoft.com/office/drawing/2014/main" id="{1B6863C9-D4E7-4991-8476-F93A073BA96A}"/>
+              </a:ext>
+            </a:extLst>
+          </p:cNvPr>
+          <p:cNvSpPr txBox="1"/>
+          <p:nvPr/>
+        </p:nvSpPr>
+        <p:spPr>
+          <a:xfrm>
+            <a:off x="1097280" y="6142082"/>
+            <a:ext cx="4023360" cy="646331"/>
+          </a:xfrm>
+          <a:prstGeom prst="rect">
+            <a:avLst/>
+          </a:prstGeom>
+          <a:noFill/>
+        </p:spPr>
+        <p:txBody>
+          <a:bodyPr wrap="square" rtlCol="0">
+            <a:spAutoFit/>
+          </a:bodyPr>
+          <a:lstStyle/>
+          <a:p>
+            <a:r>
+              <a:rPr lang="en-US" dirty="0"/>
+              <a:t>Adam Smith (1723-1790) (Ban </a:t>
+            </a:r>
+            <a:r>
+              <a:rPr lang="en-US" dirty="0" err="1"/>
+              <a:t>ve</a:t>
+            </a:r>
+            <a:r>
+              <a:rPr lang="en-US" dirty="0"/>
+              <a:t> tai san </a:t>
+            </a:r>
+            <a:r>
+              <a:rPr lang="en-US" dirty="0" err="1"/>
+              <a:t>quoc</a:t>
+            </a:r>
+            <a:r>
+              <a:rPr lang="en-US" dirty="0"/>
+              <a:t> </a:t>
+            </a:r>
+            <a:r>
+              <a:rPr lang="en-US" dirty="0" err="1"/>
+              <a:t>gia</a:t>
+            </a:r>
+            <a:r>
+              <a:rPr lang="en-US" dirty="0"/>
+              <a:t> 1776)</a:t>
+            </a:r>
+          </a:p>
+        </p:txBody>
+      </p:sp>
+      <p:sp>
+        <p:nvSpPr>
+          <p:cNvPr id="6" name="TextBox 5">
+            <a:extLst>
+              <a:ext uri="{FF2B5EF4-FFF2-40B4-BE49-F238E27FC236}">
+                <a16:creationId xmlns:a16="http://schemas.microsoft.com/office/drawing/2014/main" id="{62AA20C8-A0D8-4C08-927B-ECE114498B64}"/>
+              </a:ext>
+            </a:extLst>
+          </p:cNvPr>
+          <p:cNvSpPr txBox="1"/>
+          <p:nvPr/>
+        </p:nvSpPr>
+        <p:spPr>
+          <a:xfrm>
+            <a:off x="1097280" y="5149166"/>
+            <a:ext cx="3882683" cy="646331"/>
+          </a:xfrm>
+          <a:prstGeom prst="rect">
+            <a:avLst/>
+          </a:prstGeom>
+          <a:noFill/>
+        </p:spPr>
+        <p:txBody>
+          <a:bodyPr wrap="square" rtlCol="0">
+            <a:spAutoFit/>
+          </a:bodyPr>
+          <a:lstStyle/>
+          <a:p>
+            <a:r>
+              <a:rPr lang="en-US" dirty="0"/>
+              <a:t>David Ricardo (1772-1823) (</a:t>
+            </a:r>
+            <a:r>
+              <a:rPr lang="en-US" dirty="0" err="1"/>
+              <a:t>Kinh</a:t>
+            </a:r>
+            <a:r>
+              <a:rPr lang="en-US" dirty="0"/>
+              <a:t> </a:t>
+            </a:r>
+            <a:r>
+              <a:rPr lang="en-US" dirty="0" err="1"/>
+              <a:t>te</a:t>
+            </a:r>
+            <a:r>
+              <a:rPr lang="en-US" dirty="0"/>
+              <a:t> </a:t>
+            </a:r>
+            <a:r>
+              <a:rPr lang="en-US" dirty="0" err="1"/>
+              <a:t>chinh</a:t>
+            </a:r>
+            <a:r>
+              <a:rPr lang="en-US" dirty="0"/>
+              <a:t> tri co </a:t>
+            </a:r>
+            <a:r>
+              <a:rPr lang="en-US" dirty="0" err="1"/>
+              <a:t>dien</a:t>
+            </a:r>
+            <a:r>
+              <a:rPr lang="en-US" dirty="0"/>
+              <a:t> Anh)</a:t>
+            </a:r>
+          </a:p>
+        </p:txBody>
+      </p:sp>
     </p:spTree>
     <p:extLst>
       <p:ext uri="{BB962C8B-B14F-4D97-AF65-F5344CB8AC3E}">
@@ -1306,6 +1432,186 @@
           </a:prstGeom>
         </p:spPr>
       </p:pic>
+      <p:cxnSp>
+        <p:nvCxnSpPr>
+          <p:cNvPr id="5" name="Straight Connector 4">
+            <a:extLst>
+              <a:ext uri="{FF2B5EF4-FFF2-40B4-BE49-F238E27FC236}">
+                <a16:creationId xmlns:a16="http://schemas.microsoft.com/office/drawing/2014/main" id="{9814AA41-0596-4CDA-A33B-0E8B887C02DA}"/>
+              </a:ext>
+            </a:extLst>
+          </p:cNvPr>
+          <p:cNvCxnSpPr/>
+          <p:nvPr/>
+        </p:nvCxnSpPr>
+        <p:spPr>
+          <a:xfrm>
+            <a:off x="2954215" y="3207434"/>
+            <a:ext cx="2574388" cy="0"/>
+          </a:xfrm>
+          <a:prstGeom prst="line">
+            <a:avLst/>
+          </a:prstGeom>
+        </p:spPr>
+        <p:style>
+          <a:lnRef idx="1">
+            <a:schemeClr val="accent1"/>
+          </a:lnRef>
+          <a:fillRef idx="0">
+            <a:schemeClr val="accent1"/>
+          </a:fillRef>
+          <a:effectRef idx="0">
+            <a:schemeClr val="accent1"/>
+          </a:effectRef>
+          <a:fontRef idx="minor">
+            <a:schemeClr val="tx1"/>
+          </a:fontRef>
+        </p:style>
+      </p:cxnSp>
+      <p:cxnSp>
+        <p:nvCxnSpPr>
+          <p:cNvPr id="7" name="Straight Connector 6">
+            <a:extLst>
+              <a:ext uri="{FF2B5EF4-FFF2-40B4-BE49-F238E27FC236}">
+                <a16:creationId xmlns:a16="http://schemas.microsoft.com/office/drawing/2014/main" id="{88C05BEC-24AF-4B7E-B7AF-5B5F6CE1174A}"/>
+              </a:ext>
+            </a:extLst>
+          </p:cNvPr>
+          <p:cNvCxnSpPr/>
+          <p:nvPr/>
+        </p:nvCxnSpPr>
+        <p:spPr>
+          <a:xfrm>
+            <a:off x="7272997" y="3207434"/>
+            <a:ext cx="3052689" cy="0"/>
+          </a:xfrm>
+          <a:prstGeom prst="line">
+            <a:avLst/>
+          </a:prstGeom>
+        </p:spPr>
+        <p:style>
+          <a:lnRef idx="1">
+            <a:schemeClr val="accent1"/>
+          </a:lnRef>
+          <a:fillRef idx="0">
+            <a:schemeClr val="accent1"/>
+          </a:fillRef>
+          <a:effectRef idx="0">
+            <a:schemeClr val="accent1"/>
+          </a:effectRef>
+          <a:fontRef idx="minor">
+            <a:schemeClr val="tx1"/>
+          </a:fontRef>
+        </p:style>
+      </p:cxnSp>
+      <p:cxnSp>
+        <p:nvCxnSpPr>
+          <p:cNvPr id="9" name="Straight Connector 8">
+            <a:extLst>
+              <a:ext uri="{FF2B5EF4-FFF2-40B4-BE49-F238E27FC236}">
+                <a16:creationId xmlns:a16="http://schemas.microsoft.com/office/drawing/2014/main" id="{88C495BF-8183-4E74-823B-8758EE6466B6}"/>
+              </a:ext>
+            </a:extLst>
+          </p:cNvPr>
+          <p:cNvCxnSpPr/>
+          <p:nvPr/>
+        </p:nvCxnSpPr>
+        <p:spPr>
+          <a:xfrm>
+            <a:off x="3657600" y="3742006"/>
+            <a:ext cx="3123028" cy="0"/>
+          </a:xfrm>
+          <a:prstGeom prst="line">
+            <a:avLst/>
+          </a:prstGeom>
+        </p:spPr>
+        <p:style>
+          <a:lnRef idx="1">
+            <a:schemeClr val="accent1"/>
+          </a:lnRef>
+          <a:fillRef idx="0">
+            <a:schemeClr val="accent1"/>
+          </a:fillRef>
+          <a:effectRef idx="0">
+            <a:schemeClr val="accent1"/>
+          </a:effectRef>
+          <a:fontRef idx="minor">
+            <a:schemeClr val="tx1"/>
+          </a:fontRef>
+        </p:style>
+      </p:cxnSp>
+      <p:cxnSp>
+        <p:nvCxnSpPr>
+          <p:cNvPr id="11" name="Straight Connector 10">
+            <a:extLst>
+              <a:ext uri="{FF2B5EF4-FFF2-40B4-BE49-F238E27FC236}">
+                <a16:creationId xmlns:a16="http://schemas.microsoft.com/office/drawing/2014/main" id="{5BAEE351-06F9-44FB-95AD-D4481E2E8603}"/>
+              </a:ext>
+            </a:extLst>
+          </p:cNvPr>
+          <p:cNvCxnSpPr/>
+          <p:nvPr/>
+        </p:nvCxnSpPr>
+        <p:spPr>
+          <a:xfrm>
+            <a:off x="1026942" y="3699803"/>
+            <a:ext cx="2124221" cy="0"/>
+          </a:xfrm>
+          <a:prstGeom prst="line">
+            <a:avLst/>
+          </a:prstGeom>
+        </p:spPr>
+        <p:style>
+          <a:lnRef idx="1">
+            <a:schemeClr val="accent1"/>
+          </a:lnRef>
+          <a:fillRef idx="0">
+            <a:schemeClr val="accent1"/>
+          </a:fillRef>
+          <a:effectRef idx="0">
+            <a:schemeClr val="accent1"/>
+          </a:effectRef>
+          <a:fontRef idx="minor">
+            <a:schemeClr val="tx1"/>
+          </a:fontRef>
+        </p:style>
+      </p:cxnSp>
+      <p:cxnSp>
+        <p:nvCxnSpPr>
+          <p:cNvPr id="13" name="Straight Connector 12">
+            <a:extLst>
+              <a:ext uri="{FF2B5EF4-FFF2-40B4-BE49-F238E27FC236}">
+                <a16:creationId xmlns:a16="http://schemas.microsoft.com/office/drawing/2014/main" id="{593E4532-3E5F-4B0C-9DE2-97F5A6F7F1CB}"/>
+              </a:ext>
+            </a:extLst>
+          </p:cNvPr>
+          <p:cNvCxnSpPr/>
+          <p:nvPr/>
+        </p:nvCxnSpPr>
+        <p:spPr>
+          <a:xfrm>
+            <a:off x="11057206" y="3207434"/>
+            <a:ext cx="506437" cy="0"/>
+          </a:xfrm>
+          <a:prstGeom prst="line">
+            <a:avLst/>
+          </a:prstGeom>
+        </p:spPr>
+        <p:style>
+          <a:lnRef idx="1">
+            <a:schemeClr val="accent1"/>
+          </a:lnRef>
+          <a:fillRef idx="0">
+            <a:schemeClr val="accent1"/>
+          </a:fillRef>
+          <a:effectRef idx="0">
+            <a:schemeClr val="accent1"/>
+          </a:effectRef>
+          <a:fontRef idx="minor">
+            <a:schemeClr val="tx1"/>
+          </a:fontRef>
+        </p:style>
+      </p:cxnSp>
     </p:spTree>
     <p:extLst>
       <p:ext uri="{BB962C8B-B14F-4D97-AF65-F5344CB8AC3E}">

</xml_diff>